<commit_message>
Doc MQAM: experimental setup, eye diagrams, BER as a function of the signal to noise ratio
</commit_message>
<xml_diff>
--- a/doc/tex/sdf/m_qam_system/figures_raw/MQAM_constellation.pptx
+++ b/doc/tex/sdf/m_qam_system/figures_raw/MQAM_constellation.pptx
@@ -247,7 +247,7 @@
           <a:p>
             <a:fld id="{89535A96-58B6-429E-AC84-686953588468}" type="datetimeFigureOut">
               <a:rPr lang="pt-PT" smtClean="0"/>
-              <a:t>26-12-2017</a:t>
+              <a:t>04-01-2018</a:t>
             </a:fld>
             <a:endParaRPr lang="pt-PT"/>
           </a:p>
@@ -417,7 +417,7 @@
           <a:p>
             <a:fld id="{89535A96-58B6-429E-AC84-686953588468}" type="datetimeFigureOut">
               <a:rPr lang="pt-PT" smtClean="0"/>
-              <a:t>26-12-2017</a:t>
+              <a:t>04-01-2018</a:t>
             </a:fld>
             <a:endParaRPr lang="pt-PT"/>
           </a:p>
@@ -597,7 +597,7 @@
           <a:p>
             <a:fld id="{89535A96-58B6-429E-AC84-686953588468}" type="datetimeFigureOut">
               <a:rPr lang="pt-PT" smtClean="0"/>
-              <a:t>26-12-2017</a:t>
+              <a:t>04-01-2018</a:t>
             </a:fld>
             <a:endParaRPr lang="pt-PT"/>
           </a:p>
@@ -767,7 +767,7 @@
           <a:p>
             <a:fld id="{89535A96-58B6-429E-AC84-686953588468}" type="datetimeFigureOut">
               <a:rPr lang="pt-PT" smtClean="0"/>
-              <a:t>26-12-2017</a:t>
+              <a:t>04-01-2018</a:t>
             </a:fld>
             <a:endParaRPr lang="pt-PT"/>
           </a:p>
@@ -1013,7 +1013,7 @@
           <a:p>
             <a:fld id="{89535A96-58B6-429E-AC84-686953588468}" type="datetimeFigureOut">
               <a:rPr lang="pt-PT" smtClean="0"/>
-              <a:t>26-12-2017</a:t>
+              <a:t>04-01-2018</a:t>
             </a:fld>
             <a:endParaRPr lang="pt-PT"/>
           </a:p>
@@ -1245,7 +1245,7 @@
           <a:p>
             <a:fld id="{89535A96-58B6-429E-AC84-686953588468}" type="datetimeFigureOut">
               <a:rPr lang="pt-PT" smtClean="0"/>
-              <a:t>26-12-2017</a:t>
+              <a:t>04-01-2018</a:t>
             </a:fld>
             <a:endParaRPr lang="pt-PT"/>
           </a:p>
@@ -1612,7 +1612,7 @@
           <a:p>
             <a:fld id="{89535A96-58B6-429E-AC84-686953588468}" type="datetimeFigureOut">
               <a:rPr lang="pt-PT" smtClean="0"/>
-              <a:t>26-12-2017</a:t>
+              <a:t>04-01-2018</a:t>
             </a:fld>
             <a:endParaRPr lang="pt-PT"/>
           </a:p>
@@ -1730,7 +1730,7 @@
           <a:p>
             <a:fld id="{89535A96-58B6-429E-AC84-686953588468}" type="datetimeFigureOut">
               <a:rPr lang="pt-PT" smtClean="0"/>
-              <a:t>26-12-2017</a:t>
+              <a:t>04-01-2018</a:t>
             </a:fld>
             <a:endParaRPr lang="pt-PT"/>
           </a:p>
@@ -1825,7 +1825,7 @@
           <a:p>
             <a:fld id="{89535A96-58B6-429E-AC84-686953588468}" type="datetimeFigureOut">
               <a:rPr lang="pt-PT" smtClean="0"/>
-              <a:t>26-12-2017</a:t>
+              <a:t>04-01-2018</a:t>
             </a:fld>
             <a:endParaRPr lang="pt-PT"/>
           </a:p>
@@ -2102,7 +2102,7 @@
           <a:p>
             <a:fld id="{89535A96-58B6-429E-AC84-686953588468}" type="datetimeFigureOut">
               <a:rPr lang="pt-PT" smtClean="0"/>
-              <a:t>26-12-2017</a:t>
+              <a:t>04-01-2018</a:t>
             </a:fld>
             <a:endParaRPr lang="pt-PT"/>
           </a:p>
@@ -2355,7 +2355,7 @@
           <a:p>
             <a:fld id="{89535A96-58B6-429E-AC84-686953588468}" type="datetimeFigureOut">
               <a:rPr lang="pt-PT" smtClean="0"/>
-              <a:t>26-12-2017</a:t>
+              <a:t>04-01-2018</a:t>
             </a:fld>
             <a:endParaRPr lang="pt-PT"/>
           </a:p>
@@ -2568,7 +2568,7 @@
           <a:p>
             <a:fld id="{89535A96-58B6-429E-AC84-686953588468}" type="datetimeFigureOut">
               <a:rPr lang="pt-PT" smtClean="0"/>
-              <a:t>26-12-2017</a:t>
+              <a:t>04-01-2018</a:t>
             </a:fld>
             <a:endParaRPr lang="pt-PT"/>
           </a:p>
@@ -2987,7 +2987,7 @@
         </p:nvGrpSpPr>
         <p:grpSpPr>
           <a:xfrm>
-            <a:off x="3200398" y="1264206"/>
+            <a:off x="3904216" y="1284565"/>
             <a:ext cx="4383567" cy="4288870"/>
             <a:chOff x="3200398" y="1264206"/>
             <a:chExt cx="4383567" cy="4288870"/>

</xml_diff>